<commit_message>
add 2021 spring file
</commit_message>
<xml_diff>
--- a/135/projects/project3/project3_HareTortoiseCompetition.pptx
+++ b/135/projects/project3/project3_HareTortoiseCompetition.pptx
@@ -329,7 +329,7 @@
           <a:p>
             <a:fld id="{4F09AFFE-0D94-4082-85FD-CD67B60CD492}" type="datetimeFigureOut">
               <a:rPr lang="en-US" smtClean="0"/>
-              <a:t>11/12/20</a:t>
+              <a:t>11/23/20</a:t>
             </a:fld>
             <a:endParaRPr lang="en-US"/>
           </a:p>
@@ -497,7 +497,7 @@
           <a:p>
             <a:fld id="{4F09AFFE-0D94-4082-85FD-CD67B60CD492}" type="datetimeFigureOut">
               <a:rPr lang="en-US" smtClean="0"/>
-              <a:t>11/12/20</a:t>
+              <a:t>11/23/20</a:t>
             </a:fld>
             <a:endParaRPr lang="en-US"/>
           </a:p>
@@ -675,7 +675,7 @@
           <a:p>
             <a:fld id="{4F09AFFE-0D94-4082-85FD-CD67B60CD492}" type="datetimeFigureOut">
               <a:rPr lang="en-US" smtClean="0"/>
-              <a:t>11/12/20</a:t>
+              <a:t>11/23/20</a:t>
             </a:fld>
             <a:endParaRPr lang="en-US"/>
           </a:p>
@@ -843,7 +843,7 @@
           <a:p>
             <a:fld id="{4F09AFFE-0D94-4082-85FD-CD67B60CD492}" type="datetimeFigureOut">
               <a:rPr lang="en-US" smtClean="0"/>
-              <a:t>11/12/20</a:t>
+              <a:t>11/23/20</a:t>
             </a:fld>
             <a:endParaRPr lang="en-US"/>
           </a:p>
@@ -1088,7 +1088,7 @@
           <a:p>
             <a:fld id="{4F09AFFE-0D94-4082-85FD-CD67B60CD492}" type="datetimeFigureOut">
               <a:rPr lang="en-US" smtClean="0"/>
-              <a:t>11/12/20</a:t>
+              <a:t>11/23/20</a:t>
             </a:fld>
             <a:endParaRPr lang="en-US"/>
           </a:p>
@@ -1373,7 +1373,7 @@
           <a:p>
             <a:fld id="{4F09AFFE-0D94-4082-85FD-CD67B60CD492}" type="datetimeFigureOut">
               <a:rPr lang="en-US" smtClean="0"/>
-              <a:t>11/12/20</a:t>
+              <a:t>11/23/20</a:t>
             </a:fld>
             <a:endParaRPr lang="en-US"/>
           </a:p>
@@ -1792,7 +1792,7 @@
           <a:p>
             <a:fld id="{4F09AFFE-0D94-4082-85FD-CD67B60CD492}" type="datetimeFigureOut">
               <a:rPr lang="en-US" smtClean="0"/>
-              <a:t>11/12/20</a:t>
+              <a:t>11/23/20</a:t>
             </a:fld>
             <a:endParaRPr lang="en-US"/>
           </a:p>
@@ -1909,7 +1909,7 @@
           <a:p>
             <a:fld id="{4F09AFFE-0D94-4082-85FD-CD67B60CD492}" type="datetimeFigureOut">
               <a:rPr lang="en-US" smtClean="0"/>
-              <a:t>11/12/20</a:t>
+              <a:t>11/23/20</a:t>
             </a:fld>
             <a:endParaRPr lang="en-US"/>
           </a:p>
@@ -2004,7 +2004,7 @@
           <a:p>
             <a:fld id="{4F09AFFE-0D94-4082-85FD-CD67B60CD492}" type="datetimeFigureOut">
               <a:rPr lang="en-US" smtClean="0"/>
-              <a:t>11/12/20</a:t>
+              <a:t>11/23/20</a:t>
             </a:fld>
             <a:endParaRPr lang="en-US"/>
           </a:p>
@@ -2279,7 +2279,7 @@
           <a:p>
             <a:fld id="{4F09AFFE-0D94-4082-85FD-CD67B60CD492}" type="datetimeFigureOut">
               <a:rPr lang="en-US" smtClean="0"/>
-              <a:t>11/12/20</a:t>
+              <a:t>11/23/20</a:t>
             </a:fld>
             <a:endParaRPr lang="en-US"/>
           </a:p>
@@ -2531,7 +2531,7 @@
           <a:p>
             <a:fld id="{4F09AFFE-0D94-4082-85FD-CD67B60CD492}" type="datetimeFigureOut">
               <a:rPr lang="en-US" smtClean="0"/>
-              <a:t>11/12/20</a:t>
+              <a:t>11/23/20</a:t>
             </a:fld>
             <a:endParaRPr lang="en-US"/>
           </a:p>
@@ -2742,7 +2742,7 @@
           <a:p>
             <a:fld id="{4F09AFFE-0D94-4082-85FD-CD67B60CD492}" type="datetimeFigureOut">
               <a:rPr lang="en-US" smtClean="0"/>
-              <a:t>11/12/20</a:t>
+              <a:t>11/23/20</a:t>
             </a:fld>
             <a:endParaRPr lang="en-US"/>
           </a:p>
@@ -5281,6 +5281,14 @@
             <a:pPr marL="0" indent="0">
               <a:buNone/>
             </a:pPr>
+            <a:r>
+              <a:rPr lang="en-US" sz="2800">
+                <a:solidFill>
+                  <a:srgbClr val="CC00FF"/>
+                </a:solidFill>
+              </a:rPr>
+              <a:t>const </a:t>
+            </a:r>
             <a:r>
               <a:rPr lang="en-US" sz="2800" dirty="0">
                 <a:solidFill>

</xml_diff>